<commit_message>
Update presentations and add new quantum security materials
</commit_message>
<xml_diff>
--- a/Presentations/4.True Randomness Testing & Random Number Generators.pptx
+++ b/Presentations/4.True Randomness Testing & Random Number Generators.pptx
@@ -1926,7 +1926,7 @@
           <a:p>
             <a:fld id="{5BCAD085-E8A6-8845-BD4E-CB4CCA059FC4}" type="datetimeFigureOut">
               <a:rPr lang="en-US" smtClean="0"/>
-              <a:t>2/2/26</a:t>
+              <a:t>2/27/26</a:t>
             </a:fld>
             <a:endParaRPr lang="en-US"/>
           </a:p>
@@ -2094,7 +2094,7 @@
           <a:p>
             <a:fld id="{5BCAD085-E8A6-8845-BD4E-CB4CCA059FC4}" type="datetimeFigureOut">
               <a:rPr lang="en-US" smtClean="0"/>
-              <a:t>2/2/26</a:t>
+              <a:t>2/27/26</a:t>
             </a:fld>
             <a:endParaRPr lang="en-US"/>
           </a:p>
@@ -2272,7 +2272,7 @@
           <a:p>
             <a:fld id="{5BCAD085-E8A6-8845-BD4E-CB4CCA059FC4}" type="datetimeFigureOut">
               <a:rPr lang="en-US" smtClean="0"/>
-              <a:t>2/2/26</a:t>
+              <a:t>2/27/26</a:t>
             </a:fld>
             <a:endParaRPr lang="en-US"/>
           </a:p>
@@ -2440,7 +2440,7 @@
           <a:p>
             <a:fld id="{5BCAD085-E8A6-8845-BD4E-CB4CCA059FC4}" type="datetimeFigureOut">
               <a:rPr lang="en-US" smtClean="0"/>
-              <a:t>2/2/26</a:t>
+              <a:t>2/27/26</a:t>
             </a:fld>
             <a:endParaRPr lang="en-US"/>
           </a:p>
@@ -2685,7 +2685,7 @@
           <a:p>
             <a:fld id="{5BCAD085-E8A6-8845-BD4E-CB4CCA059FC4}" type="datetimeFigureOut">
               <a:rPr lang="en-US" smtClean="0"/>
-              <a:t>2/2/26</a:t>
+              <a:t>2/27/26</a:t>
             </a:fld>
             <a:endParaRPr lang="en-US"/>
           </a:p>
@@ -2970,7 +2970,7 @@
           <a:p>
             <a:fld id="{5BCAD085-E8A6-8845-BD4E-CB4CCA059FC4}" type="datetimeFigureOut">
               <a:rPr lang="en-US" smtClean="0"/>
-              <a:t>2/2/26</a:t>
+              <a:t>2/27/26</a:t>
             </a:fld>
             <a:endParaRPr lang="en-US"/>
           </a:p>
@@ -3389,7 +3389,7 @@
           <a:p>
             <a:fld id="{5BCAD085-E8A6-8845-BD4E-CB4CCA059FC4}" type="datetimeFigureOut">
               <a:rPr lang="en-US" smtClean="0"/>
-              <a:t>2/2/26</a:t>
+              <a:t>2/27/26</a:t>
             </a:fld>
             <a:endParaRPr lang="en-US"/>
           </a:p>
@@ -3506,7 +3506,7 @@
           <a:p>
             <a:fld id="{5BCAD085-E8A6-8845-BD4E-CB4CCA059FC4}" type="datetimeFigureOut">
               <a:rPr lang="en-US" smtClean="0"/>
-              <a:t>2/2/26</a:t>
+              <a:t>2/27/26</a:t>
             </a:fld>
             <a:endParaRPr lang="en-US"/>
           </a:p>
@@ -3601,7 +3601,7 @@
           <a:p>
             <a:fld id="{5BCAD085-E8A6-8845-BD4E-CB4CCA059FC4}" type="datetimeFigureOut">
               <a:rPr lang="en-US" smtClean="0"/>
-              <a:t>2/2/26</a:t>
+              <a:t>2/27/26</a:t>
             </a:fld>
             <a:endParaRPr lang="en-US"/>
           </a:p>
@@ -3876,7 +3876,7 @@
           <a:p>
             <a:fld id="{5BCAD085-E8A6-8845-BD4E-CB4CCA059FC4}" type="datetimeFigureOut">
               <a:rPr lang="en-US" smtClean="0"/>
-              <a:t>2/2/26</a:t>
+              <a:t>2/27/26</a:t>
             </a:fld>
             <a:endParaRPr lang="en-US"/>
           </a:p>
@@ -4128,7 +4128,7 @@
           <a:p>
             <a:fld id="{5BCAD085-E8A6-8845-BD4E-CB4CCA059FC4}" type="datetimeFigureOut">
               <a:rPr lang="en-US" smtClean="0"/>
-              <a:t>2/2/26</a:t>
+              <a:t>2/27/26</a:t>
             </a:fld>
             <a:endParaRPr lang="en-US"/>
           </a:p>
@@ -4339,7 +4339,7 @@
           <a:p>
             <a:fld id="{5BCAD085-E8A6-8845-BD4E-CB4CCA059FC4}" type="datetimeFigureOut">
               <a:rPr lang="en-US" smtClean="0"/>
-              <a:t>2/2/26</a:t>
+              <a:t>2/27/26</a:t>
             </a:fld>
             <a:endParaRPr lang="en-US"/>
           </a:p>

</xml_diff>